<commit_message>
Module3 with links. *lab12*
</commit_message>
<xml_diff>
--- a/Complimentary Course Content/Module3/Lessons/Module3_Lesson05 Developing Android Apps with Xamarin (Part 2).pptx
+++ b/Complimentary Course Content/Module3/Lessons/Module3_Lesson05 Developing Android Apps with Xamarin (Part 2).pptx
@@ -137,7 +137,7 @@
   </p:defaultTextStyle>
   <p:extLst>
     <p:ext uri="{EFAFB233-063F-42B5-8137-9DF3F51BA10A}">
-      <p15:sldGuideLst xmlns="" xmlns:p15="http://schemas.microsoft.com/office/powerpoint/2012/main">
+      <p15:sldGuideLst xmlns:p15="http://schemas.microsoft.com/office/powerpoint/2012/main" xmlns="">
         <p15:guide id="1" orient="horz" pos="2160">
           <p15:clr>
             <a:srgbClr val="A4A3A4"/>
@@ -151,7 +151,7 @@
       </p15:sldGuideLst>
     </p:ext>
     <p:ext uri="{2D200454-40CA-4A62-9FC3-DE9A4176ACB9}">
-      <p15:notesGuideLst xmlns="" xmlns:p15="http://schemas.microsoft.com/office/powerpoint/2012/main">
+      <p15:notesGuideLst xmlns:p15="http://schemas.microsoft.com/office/powerpoint/2012/main" xmlns="">
         <p15:guide id="1" orient="horz" pos="2880">
           <p15:clr>
             <a:srgbClr val="A4A3A4"/>
@@ -257,7 +257,7 @@
           <a:p>
             <a:fld id="{39B173BA-B17C-BC49-9732-4E5A18E89C75}" type="datetimeFigureOut">
               <a:rPr lang="en-US" smtClean="0"/>
-              <a:t>6/30/16</a:t>
+              <a:t>7/12/16</a:t>
             </a:fld>
             <a:endParaRPr lang="en-US"/>
           </a:p>
@@ -422,7 +422,7 @@
           <a:p>
             <a:fld id="{D371C69C-83E3-0941-8C41-0F3DBE262B4F}" type="datetimeFigureOut">
               <a:rPr lang="en-US" smtClean="0"/>
-              <a:t>6/30/16</a:t>
+              <a:t>7/12/16</a:t>
             </a:fld>
             <a:endParaRPr lang="en-US"/>
           </a:p>
@@ -1954,7 +1954,60 @@
           <a:bodyPr/>
           <a:lstStyle/>
           <a:p>
-            <a:endParaRPr lang="en-US" dirty="0"/>
+            <a:r>
+              <a:rPr lang="en-US" b="1" dirty="0" smtClean="0"/>
+              <a:t>Notes:</a:t>
+            </a:r>
+            <a:endParaRPr lang="en-US" b="0" dirty="0" smtClean="0"/>
+          </a:p>
+          <a:p>
+            <a:pPr marL="171450" indent="-171450">
+              <a:buFont typeface="Arial"/>
+              <a:buChar char="•"/>
+            </a:pPr>
+            <a:r>
+              <a:rPr lang="en-US" b="0" dirty="0" smtClean="0"/>
+              <a:t>The</a:t>
+            </a:r>
+            <a:r>
+              <a:rPr lang="en-US" b="0" baseline="0" dirty="0" smtClean="0"/>
+              <a:t> Module 3 Lesson 5 Lab should be completed at this time:</a:t>
+            </a:r>
+          </a:p>
+          <a:p>
+            <a:pPr marL="628650" lvl="1" indent="-171450">
+              <a:buFont typeface="Arial"/>
+              <a:buChar char="•"/>
+            </a:pPr>
+            <a:r>
+              <a:rPr lang="en-US" b="0" dirty="0" smtClean="0"/>
+              <a:t>https://</a:t>
+            </a:r>
+            <a:r>
+              <a:rPr lang="en-US" b="0" dirty="0" err="1" smtClean="0"/>
+              <a:t>github.com</a:t>
+            </a:r>
+            <a:r>
+              <a:rPr lang="en-US" b="0" dirty="0" smtClean="0"/>
+              <a:t>/</a:t>
+            </a:r>
+            <a:r>
+              <a:rPr lang="en-US" b="0" dirty="0" err="1" smtClean="0"/>
+              <a:t>MSFTImagine</a:t>
+            </a:r>
+            <a:r>
+              <a:rPr lang="en-US" b="0" dirty="0" smtClean="0"/>
+              <a:t>/</a:t>
+            </a:r>
+            <a:r>
+              <a:rPr lang="en-US" b="0" dirty="0" err="1" smtClean="0"/>
+              <a:t>computerscience</a:t>
+            </a:r>
+            <a:r>
+              <a:rPr lang="en-US" b="0" dirty="0" smtClean="0"/>
+              <a:t>/tree/master/Complimentary%20Course%20Content/Module3/Labs</a:t>
+            </a:r>
+            <a:endParaRPr lang="en-US" b="0" dirty="0"/>
           </a:p>
         </p:txBody>
       </p:sp>
@@ -3847,7 +3900,7 @@
           <a:p>
             <a:fld id="{0459C166-16D3-4A25-A2F8-C51E0E346B22}" type="datetimeFigureOut">
               <a:rPr lang="en-US" smtClean="0"/>
-              <a:t>6/30/16</a:t>
+              <a:t>7/12/16</a:t>
             </a:fld>
             <a:endParaRPr lang="en-US"/>
           </a:p>
@@ -4211,7 +4264,7 @@
           <a:p>
             <a:fld id="{0459C166-16D3-4A25-A2F8-C51E0E346B22}" type="datetimeFigureOut">
               <a:rPr lang="en-US" smtClean="0"/>
-              <a:t>6/30/16</a:t>
+              <a:t>7/12/16</a:t>
             </a:fld>
             <a:endParaRPr lang="en-US"/>
           </a:p>
@@ -4328,7 +4381,7 @@
           <a:p>
             <a:fld id="{0459C166-16D3-4A25-A2F8-C51E0E346B22}" type="datetimeFigureOut">
               <a:rPr lang="en-US" smtClean="0"/>
-              <a:t>6/30/16</a:t>
+              <a:t>7/12/16</a:t>
             </a:fld>
             <a:endParaRPr lang="en-US"/>
           </a:p>
@@ -4496,7 +4549,7 @@
           <a:p>
             <a:fld id="{0459C166-16D3-4A25-A2F8-C51E0E346B22}" type="datetimeFigureOut">
               <a:rPr lang="en-US" smtClean="0"/>
-              <a:t>6/30/16</a:t>
+              <a:t>7/12/16</a:t>
             </a:fld>
             <a:endParaRPr lang="en-US"/>
           </a:p>
@@ -4760,7 +4813,7 @@
             <a:fld id="{0459C166-16D3-4A25-A2F8-C51E0E346B22}" type="datetimeFigureOut">
               <a:rPr lang="en-US" smtClean="0"/>
               <a:pPr/>
-              <a:t>6/30/16</a:t>
+              <a:t>7/12/16</a:t>
             </a:fld>
             <a:endParaRPr lang="en-US"/>
           </a:p>
@@ -5076,7 +5129,7 @@
           <a:p>
             <a:fld id="{0459C166-16D3-4A25-A2F8-C51E0E346B22}" type="datetimeFigureOut">
               <a:rPr lang="en-US" smtClean="0"/>
-              <a:t>6/30/16</a:t>
+              <a:t>7/12/16</a:t>
             </a:fld>
             <a:endParaRPr lang="en-US"/>
           </a:p>
@@ -5473,7 +5526,7 @@
           <a:p>
             <a:fld id="{0459C166-16D3-4A25-A2F8-C51E0E346B22}" type="datetimeFigureOut">
               <a:rPr lang="en-US" smtClean="0"/>
-              <a:t>6/30/16</a:t>
+              <a:t>7/12/16</a:t>
             </a:fld>
             <a:endParaRPr lang="en-US"/>
           </a:p>
@@ -6436,7 +6489,7 @@
           <a:p>
             <a:fld id="{0459C166-16D3-4A25-A2F8-C51E0E346B22}" type="datetimeFigureOut">
               <a:rPr lang="en-US" smtClean="0"/>
-              <a:t>6/30/16</a:t>
+              <a:t>7/12/16</a:t>
             </a:fld>
             <a:endParaRPr lang="en-US"/>
           </a:p>
@@ -6647,7 +6700,7 @@
           <a:p>
             <a:fld id="{0459C166-16D3-4A25-A2F8-C51E0E346B22}" type="datetimeFigureOut">
               <a:rPr lang="en-US" smtClean="0"/>
-              <a:t>6/30/16</a:t>
+              <a:t>7/12/16</a:t>
             </a:fld>
             <a:endParaRPr lang="en-US"/>
           </a:p>
@@ -10441,14 +10494,14 @@
                 <a:gridCol w="3706437">
                   <a:extLst>
                     <a:ext uri="{9D8B030D-6E8A-4147-A177-3AD203B41FA5}">
-                      <a16:colId xmlns="" xmlns:a16="http://schemas.microsoft.com/office/drawing/2014/main" val="48614039"/>
+                      <a16:colId xmlns:a16="http://schemas.microsoft.com/office/drawing/2014/main" xmlns="" val="48614039"/>
                     </a:ext>
                   </a:extLst>
                 </a:gridCol>
                 <a:gridCol w="6742419">
                   <a:extLst>
                     <a:ext uri="{9D8B030D-6E8A-4147-A177-3AD203B41FA5}">
-                      <a16:colId xmlns="" xmlns:a16="http://schemas.microsoft.com/office/drawing/2014/main" val="1124546490"/>
+                      <a16:colId xmlns:a16="http://schemas.microsoft.com/office/drawing/2014/main" xmlns="" val="1124546490"/>
                     </a:ext>
                   </a:extLst>
                 </a:gridCol>
@@ -10505,7 +10558,7 @@
                 </a:tc>
                 <a:extLst>
                   <a:ext uri="{0D108BD9-81ED-4DB2-BD59-A6C34878D82A}">
-                    <a16:rowId xmlns="" xmlns:a16="http://schemas.microsoft.com/office/drawing/2014/main" val="679667022"/>
+                    <a16:rowId xmlns:a16="http://schemas.microsoft.com/office/drawing/2014/main" xmlns="" val="679667022"/>
                   </a:ext>
                 </a:extLst>
               </a:tr>
@@ -10553,7 +10606,7 @@
                 </a:tc>
                 <a:extLst>
                   <a:ext uri="{0D108BD9-81ED-4DB2-BD59-A6C34878D82A}">
-                    <a16:rowId xmlns="" xmlns:a16="http://schemas.microsoft.com/office/drawing/2014/main" val="2034482246"/>
+                    <a16:rowId xmlns:a16="http://schemas.microsoft.com/office/drawing/2014/main" xmlns="" val="2034482246"/>
                   </a:ext>
                 </a:extLst>
               </a:tr>
@@ -10601,7 +10654,7 @@
                 </a:tc>
                 <a:extLst>
                   <a:ext uri="{0D108BD9-81ED-4DB2-BD59-A6C34878D82A}">
-                    <a16:rowId xmlns="" xmlns:a16="http://schemas.microsoft.com/office/drawing/2014/main" val="682465758"/>
+                    <a16:rowId xmlns:a16="http://schemas.microsoft.com/office/drawing/2014/main" xmlns="" val="682465758"/>
                   </a:ext>
                 </a:extLst>
               </a:tr>
@@ -10648,7 +10701,7 @@
                 </a:tc>
                 <a:extLst>
                   <a:ext uri="{0D108BD9-81ED-4DB2-BD59-A6C34878D82A}">
-                    <a16:rowId xmlns="" xmlns:a16="http://schemas.microsoft.com/office/drawing/2014/main" val="4230228483"/>
+                    <a16:rowId xmlns:a16="http://schemas.microsoft.com/office/drawing/2014/main" xmlns="" val="4230228483"/>
                   </a:ext>
                 </a:extLst>
               </a:tr>
@@ -14374,7 +14427,7 @@
   <a:extraClrSchemeLst/>
   <a:extLst>
     <a:ext uri="{05A4C25C-085E-4340-85A3-A5531E510DB2}">
-      <thm15:themeFamily xmlns="" xmlns:thm15="http://schemas.microsoft.com/office/thememl/2012/main" name="Office Theme" id="{62F939B6-93AF-4DB8-9C6B-D6C7DFDC589F}" vid="{4A3C46E8-61CC-4603-A589-7422A47A8E4A}"/>
+      <thm15:themeFamily xmlns:thm15="http://schemas.microsoft.com/office/thememl/2012/main" xmlns="" name="Office Theme" id="{62F939B6-93AF-4DB8-9C6B-D6C7DFDC589F}" vid="{4A3C46E8-61CC-4603-A589-7422A47A8E4A}"/>
     </a:ext>
   </a:extLst>
 </a:theme>

</xml_diff>